<commit_message>
update slide báo cáo
</commit_message>
<xml_diff>
--- a/DP version 1.1.pptx
+++ b/DP version 1.1.pptx
@@ -302,7 +302,7 @@
           <a:p>
             <a:fld id="{784AA43A-3F76-4A13-9CD6-36134EB429E3}" type="datetimeFigureOut">
               <a:rPr lang="en-US"/>
-              <a:t>10/28/2016</a:t>
+              <a:t>11/4/2016</a:t>
             </a:fld>
             <a:endParaRPr/>
           </a:p>
@@ -467,7 +467,7 @@
           <a:p>
             <a:fld id="{5F674A4F-2B7A-4ECB-A400-260B2FFC03C1}" type="datetimeFigureOut">
               <a:rPr lang="en-US"/>
-              <a:t>10/28/2016</a:t>
+              <a:t>11/4/2016</a:t>
             </a:fld>
             <a:endParaRPr/>
           </a:p>
@@ -947,6 +947,427 @@
           <a:lstStyle/>
           <a:p>
             <a:r>
+              <a:rPr lang="en-US" smtClean="0"/>
+              <a:t>Các control trong Windows Form</a:t>
+            </a:r>
+          </a:p>
+          <a:p>
+            <a:r>
+              <a:rPr lang="en-US" smtClean="0"/>
+              <a:t>Các</a:t>
+            </a:r>
+            <a:r>
+              <a:rPr lang="en-US" baseline="0" smtClean="0"/>
+              <a:t> lớp Stream trong .NET (Buffered Reader là một decorator của Stream class)</a:t>
+            </a:r>
+          </a:p>
+          <a:p>
+            <a:r>
+              <a:rPr lang="en-US" baseline="0" smtClean="0"/>
+              <a:t>Extension method trong .NET, (cho các class bị sealed vẫn có thể them vào các phương thứ)</a:t>
+            </a:r>
+            <a:endParaRPr lang="en-US"/>
+          </a:p>
+        </p:txBody>
+      </p:sp>
+      <p:sp>
+        <p:nvSpPr>
+          <p:cNvPr id="4" name="Slide Number Placeholder 3"/>
+          <p:cNvSpPr>
+            <a:spLocks noGrp="1"/>
+          </p:cNvSpPr>
+          <p:nvPr>
+            <p:ph type="sldNum" sz="quarter" idx="10"/>
+          </p:nvPr>
+        </p:nvSpPr>
+        <p:spPr/>
+        <p:txBody>
+          <a:bodyPr/>
+          <a:lstStyle/>
+          <a:p>
+            <a:fld id="{01F2A70B-78F2-4DCF-B53B-C990D2FAFB8A}" type="slidenum">
+              <a:rPr lang="en-US" smtClean="0"/>
+              <a:t>15</a:t>
+            </a:fld>
+            <a:endParaRPr lang="en-US"/>
+          </a:p>
+        </p:txBody>
+      </p:sp>
+    </p:spTree>
+    <p:extLst>
+      <p:ext uri="{BB962C8B-B14F-4D97-AF65-F5344CB8AC3E}">
+        <p14:creationId xmlns:p14="http://schemas.microsoft.com/office/powerpoint/2010/main" val="1167471212"/>
+      </p:ext>
+    </p:extLst>
+  </p:cSld>
+  <p:clrMapOvr>
+    <a:masterClrMapping/>
+  </p:clrMapOvr>
+</p:notes>
+</file>
+
+<file path=ppt/notesSlides/notesSlide4.xml><?xml version="1.0" encoding="utf-8"?>
+<p:notes xmlns:a="http://schemas.openxmlformats.org/drawingml/2006/main" xmlns:r="http://schemas.openxmlformats.org/officeDocument/2006/relationships" xmlns:p="http://schemas.openxmlformats.org/presentationml/2006/main">
+  <p:cSld>
+    <p:spTree>
+      <p:nvGrpSpPr>
+        <p:cNvPr id="1" name=""/>
+        <p:cNvGrpSpPr/>
+        <p:nvPr/>
+      </p:nvGrpSpPr>
+      <p:grpSpPr>
+        <a:xfrm>
+          <a:off x="0" y="0"/>
+          <a:ext cx="0" cy="0"/>
+          <a:chOff x="0" y="0"/>
+          <a:chExt cx="0" cy="0"/>
+        </a:xfrm>
+      </p:grpSpPr>
+      <p:sp>
+        <p:nvSpPr>
+          <p:cNvPr id="2" name="Slide Image Placeholder 1"/>
+          <p:cNvSpPr>
+            <a:spLocks noGrp="1" noRot="1" noChangeAspect="1"/>
+          </p:cNvSpPr>
+          <p:nvPr>
+            <p:ph type="sldImg"/>
+          </p:nvPr>
+        </p:nvSpPr>
+        <p:spPr/>
+      </p:sp>
+      <p:sp>
+        <p:nvSpPr>
+          <p:cNvPr id="3" name="Notes Placeholder 2"/>
+          <p:cNvSpPr>
+            <a:spLocks noGrp="1"/>
+          </p:cNvSpPr>
+          <p:nvPr>
+            <p:ph type="body" idx="1"/>
+          </p:nvPr>
+        </p:nvSpPr>
+        <p:spPr/>
+        <p:txBody>
+          <a:bodyPr/>
+          <a:lstStyle/>
+          <a:p>
+            <a:pPr marL="0" marR="0" indent="0" algn="l" defTabSz="914400" rtl="0" eaLnBrk="1" fontAlgn="auto" latinLnBrk="0" hangingPunct="1">
+              <a:lnSpc>
+                <a:spcPct val="100000"/>
+              </a:lnSpc>
+              <a:spcBef>
+                <a:spcPts val="0"/>
+              </a:spcBef>
+              <a:spcAft>
+                <a:spcPts val="0"/>
+              </a:spcAft>
+              <a:buClrTx/>
+              <a:buSzTx/>
+              <a:buFontTx/>
+              <a:buNone/>
+              <a:tabLst/>
+              <a:defRPr/>
+            </a:pPr>
+            <a:r>
+              <a:rPr lang="en-US" sz="1200" kern="1200" smtClean="0">
+                <a:solidFill>
+                  <a:schemeClr val="tx1"/>
+                </a:solidFill>
+                <a:effectLst/>
+                <a:latin typeface="+mn-lt"/>
+                <a:ea typeface="+mn-ea"/>
+                <a:cs typeface="+mn-cs"/>
+              </a:rPr>
+              <a:t>Các mẫu Proxy được sử dụng khi bạn cần để biểu diễn một đối tượng phức tạp hay tốn thời gian để tạo ra bằng một thứ đơn giản hơn.</a:t>
+            </a:r>
+          </a:p>
+          <a:p>
+            <a:r>
+              <a:rPr lang="en-US" sz="1200" kern="1200" smtClean="0">
+                <a:solidFill>
+                  <a:schemeClr val="tx1"/>
+                </a:solidFill>
+                <a:effectLst/>
+                <a:latin typeface="+mn-lt"/>
+                <a:ea typeface="+mn-ea"/>
+                <a:cs typeface="+mn-cs"/>
+              </a:rPr>
+              <a:t>Nếu việc tạo ra một đối tượng mới mất nhiều thời gian hay tài nguyên máy tính, Proxy cho phép chúng ta trì hoãn quá trình tạo đối tượng cho đến khi chúng ta cần đối tượng thực sự.</a:t>
+            </a:r>
+          </a:p>
+          <a:p>
+            <a:r>
+              <a:rPr lang="en-US" sz="1200" kern="1200" smtClean="0">
+                <a:solidFill>
+                  <a:schemeClr val="tx1"/>
+                </a:solidFill>
+                <a:effectLst/>
+                <a:latin typeface="+mn-lt"/>
+                <a:ea typeface="+mn-ea"/>
+                <a:cs typeface="+mn-cs"/>
+              </a:rPr>
+              <a:t>Một mẫu Proxy thường có chung các phương thúc giống như đối tượng mà nó đại diện, và một khi đối tượng được nạp vào bộ nhớ, các lời gọi hàm đến đối tượng thực sự này sẽ được chuyển tiếp qua Proxy</a:t>
+            </a:r>
+            <a:endParaRPr lang="en-US"/>
+          </a:p>
+        </p:txBody>
+      </p:sp>
+      <p:sp>
+        <p:nvSpPr>
+          <p:cNvPr id="4" name="Slide Number Placeholder 3"/>
+          <p:cNvSpPr>
+            <a:spLocks noGrp="1"/>
+          </p:cNvSpPr>
+          <p:nvPr>
+            <p:ph type="sldNum" sz="quarter" idx="10"/>
+          </p:nvPr>
+        </p:nvSpPr>
+        <p:spPr/>
+        <p:txBody>
+          <a:bodyPr/>
+          <a:lstStyle/>
+          <a:p>
+            <a:fld id="{01F2A70B-78F2-4DCF-B53B-C990D2FAFB8A}" type="slidenum">
+              <a:rPr lang="en-US" smtClean="0"/>
+              <a:t>18</a:t>
+            </a:fld>
+            <a:endParaRPr lang="en-US"/>
+          </a:p>
+        </p:txBody>
+      </p:sp>
+    </p:spTree>
+    <p:extLst>
+      <p:ext uri="{BB962C8B-B14F-4D97-AF65-F5344CB8AC3E}">
+        <p14:creationId xmlns:p14="http://schemas.microsoft.com/office/powerpoint/2010/main" val="1177798322"/>
+      </p:ext>
+    </p:extLst>
+  </p:cSld>
+  <p:clrMapOvr>
+    <a:masterClrMapping/>
+  </p:clrMapOvr>
+</p:notes>
+</file>
+
+<file path=ppt/notesSlides/notesSlide5.xml><?xml version="1.0" encoding="utf-8"?>
+<p:notes xmlns:a="http://schemas.openxmlformats.org/drawingml/2006/main" xmlns:r="http://schemas.openxmlformats.org/officeDocument/2006/relationships" xmlns:p="http://schemas.openxmlformats.org/presentationml/2006/main">
+  <p:cSld>
+    <p:spTree>
+      <p:nvGrpSpPr>
+        <p:cNvPr id="1" name=""/>
+        <p:cNvGrpSpPr/>
+        <p:nvPr/>
+      </p:nvGrpSpPr>
+      <p:grpSpPr>
+        <a:xfrm>
+          <a:off x="0" y="0"/>
+          <a:ext cx="0" cy="0"/>
+          <a:chOff x="0" y="0"/>
+          <a:chExt cx="0" cy="0"/>
+        </a:xfrm>
+      </p:grpSpPr>
+      <p:sp>
+        <p:nvSpPr>
+          <p:cNvPr id="2" name="Slide Image Placeholder 1"/>
+          <p:cNvSpPr>
+            <a:spLocks noGrp="1" noRot="1" noChangeAspect="1"/>
+          </p:cNvSpPr>
+          <p:nvPr>
+            <p:ph type="sldImg"/>
+          </p:nvPr>
+        </p:nvSpPr>
+        <p:spPr/>
+      </p:sp>
+      <p:sp>
+        <p:nvSpPr>
+          <p:cNvPr id="3" name="Notes Placeholder 2"/>
+          <p:cNvSpPr>
+            <a:spLocks noGrp="1"/>
+          </p:cNvSpPr>
+          <p:nvPr>
+            <p:ph type="body" idx="1"/>
+          </p:nvPr>
+        </p:nvSpPr>
+        <p:spPr/>
+        <p:txBody>
+          <a:bodyPr/>
+          <a:lstStyle/>
+          <a:p>
+            <a:r>
+              <a:rPr lang="en-US" sz="1200" kern="1200" smtClean="0">
+                <a:solidFill>
+                  <a:schemeClr val="tx1"/>
+                </a:solidFill>
+                <a:effectLst/>
+                <a:latin typeface="+mn-lt"/>
+                <a:ea typeface="+mn-ea"/>
+                <a:cs typeface="+mn-cs"/>
+              </a:rPr>
+              <a:t>1. Một đối tượng, chẳng hạn như một file ảnh, mất quá nhiều thời gian để load.</a:t>
+            </a:r>
+          </a:p>
+          <a:p>
+            <a:r>
+              <a:rPr lang="en-US" sz="1200" kern="1200" smtClean="0">
+                <a:solidFill>
+                  <a:schemeClr val="tx1"/>
+                </a:solidFill>
+                <a:effectLst/>
+                <a:latin typeface="+mn-lt"/>
+                <a:ea typeface="+mn-ea"/>
+                <a:cs typeface="+mn-cs"/>
+              </a:rPr>
+              <a:t>2. Kết quả của một tính toán cần nhiều thời gian để hoàn thành, và bạn cần hiển thị các kết quả ngay lập tức trong khi quá trình tính toán vẫn đang tiếp tục.</a:t>
+            </a:r>
+          </a:p>
+          <a:p>
+            <a:r>
+              <a:rPr lang="en-US" sz="1200" kern="1200" smtClean="0">
+                <a:solidFill>
+                  <a:schemeClr val="tx1"/>
+                </a:solidFill>
+                <a:effectLst/>
+                <a:latin typeface="+mn-lt"/>
+                <a:ea typeface="+mn-ea"/>
+                <a:cs typeface="+mn-cs"/>
+              </a:rPr>
+              <a:t>3. Đối tượng nằm ở trên một máy remote, và tải nó thông qua mạng có thể mất nhiều thời gian, đặc biệt trong những thời điểm mạng lag.</a:t>
+            </a:r>
+          </a:p>
+          <a:p>
+            <a:r>
+              <a:rPr lang="en-US" sz="1200" kern="1200" smtClean="0">
+                <a:solidFill>
+                  <a:schemeClr val="tx1"/>
+                </a:solidFill>
+                <a:effectLst/>
+                <a:latin typeface="+mn-lt"/>
+                <a:ea typeface="+mn-ea"/>
+                <a:cs typeface="+mn-cs"/>
+              </a:rPr>
+              <a:t>4. Quyền truy cập đối tượng bị hạn chế, và proxy có thể xác nhận quyền truy cần của người dùng.</a:t>
+            </a:r>
+          </a:p>
+          <a:p>
+            <a:endParaRPr lang="en-US" smtClean="0"/>
+          </a:p>
+          <a:p>
+            <a:r>
+              <a:rPr lang="en-US" sz="1200" kern="1200" smtClean="0">
+                <a:solidFill>
+                  <a:schemeClr val="tx1"/>
+                </a:solidFill>
+                <a:effectLst/>
+                <a:latin typeface="+mn-lt"/>
+                <a:ea typeface="+mn-ea"/>
+                <a:cs typeface="+mn-cs"/>
+              </a:rPr>
+              <a:t>Giả sử trong trường hợp chương trình cần nạp và hiển thị một file ảnh có dung lượng lớn. Khi chương trình khởi động, cần có một vài dấu hiệu cho người dùng thấy rằng bức ảnh đó sẽ được hiển thị trên màn hình và nằm đúng vị trí, nhưng thực sự thì việc hiển thị hình ảnh sẽ bị trì hoãn lại cho đến khi nào việc nạp bức ảnh hoàn tất.</a:t>
+            </a:r>
+          </a:p>
+          <a:p>
+            <a:r>
+              <a:rPr lang="en-US" sz="1200" kern="1200" smtClean="0">
+                <a:solidFill>
+                  <a:schemeClr val="tx1"/>
+                </a:solidFill>
+                <a:effectLst/>
+                <a:latin typeface="+mn-lt"/>
+                <a:ea typeface="+mn-ea"/>
+                <a:cs typeface="+mn-cs"/>
+              </a:rPr>
+              <a:t>Điều này đặc biệt quan trọng trong các chương trình xử lí văn bản hay các trình duyệt Web khi chúng đặt các dòng chữ nằm xung quanh các bức ảnh thậm chí trước khi cả tấm ảnh đó được hiển </a:t>
+            </a:r>
+            <a:r>
+              <a:rPr lang="en-US" smtClean="0"/>
+              <a:t/>
+            </a:r>
+            <a:br>
+              <a:rPr lang="en-US" smtClean="0"/>
+            </a:br>
+            <a:endParaRPr lang="en-US"/>
+          </a:p>
+        </p:txBody>
+      </p:sp>
+      <p:sp>
+        <p:nvSpPr>
+          <p:cNvPr id="4" name="Slide Number Placeholder 3"/>
+          <p:cNvSpPr>
+            <a:spLocks noGrp="1"/>
+          </p:cNvSpPr>
+          <p:nvPr>
+            <p:ph type="sldNum" sz="quarter" idx="10"/>
+          </p:nvPr>
+        </p:nvSpPr>
+        <p:spPr/>
+        <p:txBody>
+          <a:bodyPr/>
+          <a:lstStyle/>
+          <a:p>
+            <a:fld id="{01F2A70B-78F2-4DCF-B53B-C990D2FAFB8A}" type="slidenum">
+              <a:rPr lang="en-US" smtClean="0"/>
+              <a:t>19</a:t>
+            </a:fld>
+            <a:endParaRPr lang="en-US"/>
+          </a:p>
+        </p:txBody>
+      </p:sp>
+    </p:spTree>
+    <p:extLst>
+      <p:ext uri="{BB962C8B-B14F-4D97-AF65-F5344CB8AC3E}">
+        <p14:creationId xmlns:p14="http://schemas.microsoft.com/office/powerpoint/2010/main" val="1071599502"/>
+      </p:ext>
+    </p:extLst>
+  </p:cSld>
+  <p:clrMapOvr>
+    <a:masterClrMapping/>
+  </p:clrMapOvr>
+</p:notes>
+</file>
+
+<file path=ppt/notesSlides/notesSlide6.xml><?xml version="1.0" encoding="utf-8"?>
+<p:notes xmlns:a="http://schemas.openxmlformats.org/drawingml/2006/main" xmlns:r="http://schemas.openxmlformats.org/officeDocument/2006/relationships" xmlns:p="http://schemas.openxmlformats.org/presentationml/2006/main">
+  <p:cSld>
+    <p:spTree>
+      <p:nvGrpSpPr>
+        <p:cNvPr id="1" name=""/>
+        <p:cNvGrpSpPr/>
+        <p:nvPr/>
+      </p:nvGrpSpPr>
+      <p:grpSpPr>
+        <a:xfrm>
+          <a:off x="0" y="0"/>
+          <a:ext cx="0" cy="0"/>
+          <a:chOff x="0" y="0"/>
+          <a:chExt cx="0" cy="0"/>
+        </a:xfrm>
+      </p:grpSpPr>
+      <p:sp>
+        <p:nvSpPr>
+          <p:cNvPr id="2" name="Slide Image Placeholder 1"/>
+          <p:cNvSpPr>
+            <a:spLocks noGrp="1" noRot="1" noChangeAspect="1"/>
+          </p:cNvSpPr>
+          <p:nvPr>
+            <p:ph type="sldImg"/>
+          </p:nvPr>
+        </p:nvSpPr>
+        <p:spPr/>
+      </p:sp>
+      <p:sp>
+        <p:nvSpPr>
+          <p:cNvPr id="3" name="Notes Placeholder 2"/>
+          <p:cNvSpPr>
+            <a:spLocks noGrp="1"/>
+          </p:cNvSpPr>
+          <p:nvPr>
+            <p:ph type="body" idx="1"/>
+          </p:nvPr>
+        </p:nvSpPr>
+        <p:spPr/>
+        <p:txBody>
+          <a:bodyPr/>
+          <a:lstStyle/>
+          <a:p>
+            <a:r>
               <a:rPr lang="en-US" sz="1200" b="0" i="0" kern="1200">
                 <a:solidFill>
                   <a:schemeClr val="tx1"/>
@@ -956,7 +1377,136 @@
                 <a:ea typeface="+mn-ea"/>
                 <a:cs typeface="+mn-cs"/>
               </a:rPr>
-              <a:t>A client obtains a reference to a Proxy, the client then handles the proxy in the same way it handles RealSubject and thus invoking the method doSomething(). At that point the proxy can do different things prior to invoking RealSubject�s doSomething() method. The client might create a RealSubject object at that point, perform initialization, check permissions of the client to invoke the method, and then invoke the method on the object. The client can also do additional tasks after invoking the doSomething() method, such as incrementing the number of references to the object.</a:t>
+              <a:t>A client obtains a reference to a Proxy, the client then handles the proxy in the same way it handles RealSubject and thus invoking the method doSomething(). </a:t>
+            </a:r>
+            <a:endParaRPr lang="en-US" sz="1200" b="0" i="0" kern="1200" smtClean="0">
+              <a:solidFill>
+                <a:schemeClr val="tx1"/>
+              </a:solidFill>
+              <a:effectLst/>
+              <a:latin typeface="+mn-lt"/>
+              <a:ea typeface="+mn-ea"/>
+              <a:cs typeface="+mn-cs"/>
+            </a:endParaRPr>
+          </a:p>
+          <a:p>
+            <a:r>
+              <a:rPr lang="en-US" sz="1200" b="0" i="0" kern="1200" smtClean="0">
+                <a:solidFill>
+                  <a:schemeClr val="tx1"/>
+                </a:solidFill>
+                <a:effectLst/>
+                <a:latin typeface="+mn-lt"/>
+                <a:ea typeface="+mn-ea"/>
+                <a:cs typeface="+mn-cs"/>
+              </a:rPr>
+              <a:t>At </a:t>
+            </a:r>
+            <a:r>
+              <a:rPr lang="en-US" sz="1200" b="0" i="0" kern="1200">
+                <a:solidFill>
+                  <a:schemeClr val="tx1"/>
+                </a:solidFill>
+                <a:effectLst/>
+                <a:latin typeface="+mn-lt"/>
+                <a:ea typeface="+mn-ea"/>
+                <a:cs typeface="+mn-cs"/>
+              </a:rPr>
+              <a:t>that point the proxy can do different things prior to invoking </a:t>
+            </a:r>
+            <a:r>
+              <a:rPr lang="en-US" sz="1200" b="0" i="0" kern="1200" smtClean="0">
+                <a:solidFill>
+                  <a:schemeClr val="tx1"/>
+                </a:solidFill>
+                <a:effectLst/>
+                <a:latin typeface="+mn-lt"/>
+                <a:ea typeface="+mn-ea"/>
+                <a:cs typeface="+mn-cs"/>
+              </a:rPr>
+              <a:t>RealSubject’s </a:t>
+            </a:r>
+            <a:r>
+              <a:rPr lang="en-US" sz="1200" b="0" i="0" kern="1200">
+                <a:solidFill>
+                  <a:schemeClr val="tx1"/>
+                </a:solidFill>
+                <a:effectLst/>
+                <a:latin typeface="+mn-lt"/>
+                <a:ea typeface="+mn-ea"/>
+                <a:cs typeface="+mn-cs"/>
+              </a:rPr>
+              <a:t>doSomething() method. </a:t>
+            </a:r>
+            <a:endParaRPr lang="en-US" sz="1200" b="0" i="0" kern="1200" smtClean="0">
+              <a:solidFill>
+                <a:schemeClr val="tx1"/>
+              </a:solidFill>
+              <a:effectLst/>
+              <a:latin typeface="+mn-lt"/>
+              <a:ea typeface="+mn-ea"/>
+              <a:cs typeface="+mn-cs"/>
+            </a:endParaRPr>
+          </a:p>
+          <a:p>
+            <a:r>
+              <a:rPr lang="en-US" sz="1200" b="0" i="0" kern="1200" smtClean="0">
+                <a:solidFill>
+                  <a:schemeClr val="tx1"/>
+                </a:solidFill>
+                <a:effectLst/>
+                <a:latin typeface="+mn-lt"/>
+                <a:ea typeface="+mn-ea"/>
+                <a:cs typeface="+mn-cs"/>
+              </a:rPr>
+              <a:t>The </a:t>
+            </a:r>
+            <a:r>
+              <a:rPr lang="en-US" sz="1200" b="0" i="0" kern="1200">
+                <a:solidFill>
+                  <a:schemeClr val="tx1"/>
+                </a:solidFill>
+                <a:effectLst/>
+                <a:latin typeface="+mn-lt"/>
+                <a:ea typeface="+mn-ea"/>
+                <a:cs typeface="+mn-cs"/>
+              </a:rPr>
+              <a:t>client might create a RealSubject object at that point, perform initialization, check permissions of the client to invoke the method, and then invoke the method on the object. </a:t>
+            </a:r>
+            <a:endParaRPr lang="en-US" sz="1200" b="0" i="0" kern="1200" smtClean="0">
+              <a:solidFill>
+                <a:schemeClr val="tx1"/>
+              </a:solidFill>
+              <a:effectLst/>
+              <a:latin typeface="+mn-lt"/>
+              <a:ea typeface="+mn-ea"/>
+              <a:cs typeface="+mn-cs"/>
+            </a:endParaRPr>
+          </a:p>
+          <a:p>
+            <a:r>
+              <a:rPr lang="en-US" sz="1200" b="0" i="0" kern="1200" smtClean="0">
+                <a:solidFill>
+                  <a:schemeClr val="tx1"/>
+                </a:solidFill>
+                <a:effectLst/>
+                <a:latin typeface="+mn-lt"/>
+                <a:ea typeface="+mn-ea"/>
+                <a:cs typeface="+mn-cs"/>
+              </a:rPr>
+              <a:t>The </a:t>
+            </a:r>
+            <a:r>
+              <a:rPr lang="en-US" sz="1200" b="0" i="0" kern="1200">
+                <a:solidFill>
+                  <a:schemeClr val="tx1"/>
+                </a:solidFill>
+                <a:effectLst/>
+                <a:latin typeface="+mn-lt"/>
+                <a:ea typeface="+mn-ea"/>
+                <a:cs typeface="+mn-cs"/>
+              </a:rPr>
+              <a:t>client can also do additional tasks after invoking the doSomething() method, such as incrementing the number of references to the object.</a:t>
             </a:r>
             <a:endParaRPr lang="en-US"/>
           </a:p>
@@ -1225,7 +1775,7 @@
             <a:fld id="{B61BEF0D-F0BB-DE4B-95CE-6DB70DBA9567}" type="datetimeFigureOut">
               <a:rPr lang="en-US" smtClean="0"/>
               <a:pPr/>
-              <a:t>10/28/2016</a:t>
+              <a:t>11/4/2016</a:t>
             </a:fld>
             <a:endParaRPr lang="en-US" dirty="0"/>
           </a:p>
@@ -1446,7 +1996,7 @@
           <a:p>
             <a:fld id="{9AFE8FB1-0A7A-443E-AAF7-31D4FA1AA312}" type="datetimeFigureOut">
               <a:rPr lang="en-US" smtClean="0"/>
-              <a:t>10/28/2016</a:t>
+              <a:t>11/4/2016</a:t>
             </a:fld>
             <a:endParaRPr lang="en-US"/>
           </a:p>
@@ -1714,7 +2264,7 @@
           <a:p>
             <a:fld id="{9AFE8FB1-0A7A-443E-AAF7-31D4FA1AA312}" type="datetimeFigureOut">
               <a:rPr lang="en-US" smtClean="0"/>
-              <a:t>10/28/2016</a:t>
+              <a:t>11/4/2016</a:t>
             </a:fld>
             <a:endParaRPr lang="en-US"/>
           </a:p>
@@ -1900,7 +2450,7 @@
           <a:p>
             <a:fld id="{9AFE8FB1-0A7A-443E-AAF7-31D4FA1AA312}" type="datetimeFigureOut">
               <a:rPr lang="en-US" smtClean="0"/>
-              <a:t>10/28/2016</a:t>
+              <a:t>11/4/2016</a:t>
             </a:fld>
             <a:endParaRPr lang="en-US"/>
           </a:p>
@@ -2255,7 +2805,7 @@
           <a:p>
             <a:fld id="{9AFE8FB1-0A7A-443E-AAF7-31D4FA1AA312}" type="datetimeFigureOut">
               <a:rPr lang="en-US" smtClean="0"/>
-              <a:t>10/28/2016</a:t>
+              <a:t>11/4/2016</a:t>
             </a:fld>
             <a:endParaRPr lang="en-US"/>
           </a:p>
@@ -2542,7 +3092,7 @@
           <a:p>
             <a:fld id="{9AFE8FB1-0A7A-443E-AAF7-31D4FA1AA312}" type="datetimeFigureOut">
               <a:rPr lang="en-US" smtClean="0"/>
-              <a:t>10/28/2016</a:t>
+              <a:t>11/4/2016</a:t>
             </a:fld>
             <a:endParaRPr lang="en-US"/>
           </a:p>
@@ -2933,7 +3483,7 @@
           <a:p>
             <a:fld id="{9AFE8FB1-0A7A-443E-AAF7-31D4FA1AA312}" type="datetimeFigureOut">
               <a:rPr lang="en-US" smtClean="0"/>
-              <a:t>10/28/2016</a:t>
+              <a:t>11/4/2016</a:t>
             </a:fld>
             <a:endParaRPr lang="en-US"/>
           </a:p>
@@ -3063,7 +3613,7 @@
           <a:p>
             <a:fld id="{9AFE8FB1-0A7A-443E-AAF7-31D4FA1AA312}" type="datetimeFigureOut">
               <a:rPr lang="en-US" smtClean="0"/>
-              <a:t>10/28/2016</a:t>
+              <a:t>11/4/2016</a:t>
             </a:fld>
             <a:endParaRPr lang="en-US"/>
           </a:p>
@@ -3246,7 +3796,7 @@
           <a:p>
             <a:fld id="{9AFE8FB1-0A7A-443E-AAF7-31D4FA1AA312}" type="datetimeFigureOut">
               <a:rPr lang="en-US" smtClean="0"/>
-              <a:t>10/28/2016</a:t>
+              <a:t>11/4/2016</a:t>
             </a:fld>
             <a:endParaRPr lang="en-US"/>
           </a:p>
@@ -3612,7 +4162,7 @@
           <a:p>
             <a:fld id="{9AFE8FB1-0A7A-443E-AAF7-31D4FA1AA312}" type="datetimeFigureOut">
               <a:rPr lang="en-US" smtClean="0"/>
-              <a:t>10/28/2016</a:t>
+              <a:t>11/4/2016</a:t>
             </a:fld>
             <a:endParaRPr lang="en-US"/>
           </a:p>
@@ -4006,7 +4556,7 @@
           <a:p>
             <a:fld id="{9AFE8FB1-0A7A-443E-AAF7-31D4FA1AA312}" type="datetimeFigureOut">
               <a:rPr lang="en-US" smtClean="0"/>
-              <a:t>10/28/2016</a:t>
+              <a:t>11/4/2016</a:t>
             </a:fld>
             <a:endParaRPr lang="en-US"/>
           </a:p>
@@ -4306,7 +4856,7 @@
             <a:fld id="{9AFE8FB1-0A7A-443E-AAF7-31D4FA1AA312}" type="datetimeFigureOut">
               <a:rPr lang="en-US" smtClean="0"/>
               <a:pPr/>
-              <a:t>10/28/2016</a:t>
+              <a:t>11/4/2016</a:t>
             </a:fld>
             <a:endParaRPr lang="en-US"/>
           </a:p>
@@ -5339,23 +5889,21 @@
             <a:pPr lvl="1"/>
             <a:r>
               <a:rPr lang="vi-VN"/>
-              <a:t>Decorator đơn giản hóa mã bằng cách cho phép bạn để phát triển một loạt các chức năng từ ứng với các class tương ứng thay vì thêm tất cả các hành vi vào một đối tượng.</a:t>
+              <a:t>Decorator đơn giản hóa mã bằng cách cho phép bạn để phát triển một loạt các chức năng từ ứng với các class tương ứng thay vì thêm tất cả các hành vi vào một đối tượng</a:t>
+            </a:r>
+            <a:r>
+              <a:rPr lang="vi-VN" smtClean="0"/>
+              <a:t>.</a:t>
+            </a:r>
+            <a:endParaRPr lang="en-US" smtClean="0"/>
+          </a:p>
+          <a:p>
+            <a:pPr lvl="1"/>
+            <a:r>
+              <a:rPr lang="en-US" smtClean="0"/>
+              <a:t>Việc trang trí đối tượng bằng cách thêm vào các chức năng trong thời gian runtime làm cho việc debug chương trình khó khan hơn.</a:t>
             </a:r>
             <a:endParaRPr lang="en-US"/>
-          </a:p>
-          <a:p>
-            <a:pPr lvl="1"/>
-            <a:r>
-              <a:rPr lang="en-US"/>
-              <a:t>Decoration is more convenient for adding functionalities to objects instead of entire classes at runtime. With decoration it is also possible to remove the added functionalities dynamically.</a:t>
-            </a:r>
-          </a:p>
-          <a:p>
-            <a:pPr lvl="1"/>
-            <a:r>
-              <a:rPr lang="en-US"/>
-              <a:t>Decoration adds functionality to objects at runtime which would make debugging system functionality harder.</a:t>
-            </a:r>
           </a:p>
           <a:p>
             <a:pPr lvl="1"/>
@@ -5442,7 +5990,21 @@
           <a:bodyPr/>
           <a:lstStyle/>
           <a:p>
+            <a:r>
+              <a:rPr lang="en-US"/>
+              <a:t>- Chỉ có duy nhất một đối tượng bên trong một Decorator, có thể có nhiều các tùy chọn trang trí hay các lớp bao, và có một giao diện chung cho chúng nhằm giúp cho các lớp có thể hoán đổi với nhau (interchangeable</a:t>
+            </a:r>
+            <a:r>
+              <a:rPr lang="en-US" smtClean="0"/>
+              <a:t>).</a:t>
+            </a:r>
             <a:endParaRPr lang="en-US"/>
+          </a:p>
+          <a:p>
+            <a:r>
+              <a:rPr lang="en-US"/>
+              <a:t>- Lớp Decorator cần mô tả mối quan hệ thành phần với đối</a:t>
+            </a:r>
           </a:p>
         </p:txBody>
       </p:sp>
@@ -5525,6 +6087,34 @@
           <a:bodyPr/>
           <a:lstStyle/>
           <a:p>
+            <a:pPr lvl="1"/>
+            <a:r>
+              <a:rPr lang="en-US"/>
+              <a:t>Phát biểu bài toán</a:t>
+            </a:r>
+          </a:p>
+          <a:p>
+            <a:pPr lvl="1"/>
+            <a:r>
+              <a:rPr lang="en-US"/>
+              <a:t>Sơ đồ lớp</a:t>
+            </a:r>
+          </a:p>
+          <a:p>
+            <a:pPr lvl="1"/>
+            <a:r>
+              <a:rPr lang="en-US"/>
+              <a:t>Code mẫu</a:t>
+            </a:r>
+          </a:p>
+          <a:p>
+            <a:pPr lvl="1"/>
+            <a:r>
+              <a:rPr lang="en-US"/>
+              <a:t>Mối quan hệ của các đối tượng trong code mẫu.</a:t>
+            </a:r>
+          </a:p>
+          <a:p>
             <a:endParaRPr lang="en-US"/>
           </a:p>
         </p:txBody>
@@ -5593,32 +6183,28 @@
           </a:p>
         </p:txBody>
       </p:sp>
-      <p:pic>
-        <p:nvPicPr>
-          <p:cNvPr id="4" name="Content Placeholder 3"/>
-          <p:cNvPicPr>
-            <a:picLocks noGrp="1" noChangeAspect="1"/>
-          </p:cNvPicPr>
+      <p:sp>
+        <p:nvSpPr>
+          <p:cNvPr id="2" name="Content Placeholder 1"/>
+          <p:cNvSpPr>
+            <a:spLocks noGrp="1"/>
+          </p:cNvSpPr>
           <p:nvPr>
             <p:ph idx="1"/>
           </p:nvPr>
-        </p:nvPicPr>
-        <p:blipFill>
-          <a:blip r:embed="rId2"/>
-          <a:stretch>
-            <a:fillRect/>
-          </a:stretch>
-        </p:blipFill>
-        <p:spPr>
-          <a:xfrm>
-            <a:off x="2894012" y="2286000"/>
-            <a:ext cx="5878944" cy="2984695"/>
-          </a:xfrm>
-          <a:prstGeom prst="rect">
-            <a:avLst/>
-          </a:prstGeom>
-        </p:spPr>
-      </p:pic>
+        </p:nvSpPr>
+        <p:spPr/>
+        <p:txBody>
+          <a:bodyPr/>
+          <a:lstStyle/>
+          <a:p>
+            <a:pPr marL="0" indent="0">
+              <a:buNone/>
+            </a:pPr>
+            <a:endParaRPr lang="en-US" smtClean="0"/>
+          </a:p>
+        </p:txBody>
+      </p:sp>
     </p:spTree>
     <p:extLst>
       <p:ext uri="{BB962C8B-B14F-4D97-AF65-F5344CB8AC3E}">
@@ -5641,6 +6227,13 @@
       </p:transition>
     </mc:Fallback>
   </mc:AlternateContent>
+  <p:timing>
+    <p:tnLst>
+      <p:par>
+        <p:cTn id="1" dur="indefinite" restart="never" nodeType="tmRoot"/>
+      </p:par>
+    </p:tnLst>
+  </p:timing>
 </p:sld>
 </file>
 
@@ -5756,6 +6349,13 @@
       </p:transition>
     </mc:Fallback>
   </mc:AlternateContent>
+  <p:timing>
+    <p:tnLst>
+      <p:par>
+        <p:cTn id="1" dur="indefinite" restart="never" nodeType="tmRoot"/>
+      </p:par>
+    </p:tnLst>
+  </p:timing>
 </p:sld>
 </file>
 
@@ -5934,6 +6534,13 @@
       </p:transition>
     </mc:Fallback>
   </mc:AlternateContent>
+  <p:timing>
+    <p:tnLst>
+      <p:par>
+        <p:cTn id="1" dur="indefinite" restart="never" nodeType="tmRoot"/>
+      </p:par>
+    </p:tnLst>
+  </p:timing>
 </p:sld>
 </file>
 
@@ -5994,16 +6601,16 @@
           <a:p>
             <a:pPr lvl="1"/>
             <a:r>
-              <a:rPr lang="en-US" i="1"/>
+              <a:rPr lang="en-US" i="1" smtClean="0"/>
               <a:t>“</a:t>
             </a:r>
             <a:r>
-              <a:rPr lang="vi-VN" i="1"/>
-              <a:t>Gắn kết thêm một số tính năng cho đối tượng một cách linh động. Mẫu trang trí Decorator cung cấp một phương pháp linh hoạt hơn là sử dụng lớp con để mở rộng chức năng cho đối tượng</a:t>
-            </a:r>
-            <a:r>
-              <a:rPr lang="en-US"/>
-              <a:t>.” (GoF)</a:t>
+              <a:rPr lang="en-US" smtClean="0"/>
+              <a:t>.” </a:t>
+            </a:r>
+            <a:r>
+              <a:rPr lang="en-US"/>
+              <a:t>(GoF)</a:t>
             </a:r>
           </a:p>
           <a:p>
@@ -6033,6 +6640,13 @@
       </p:transition>
     </mc:Fallback>
   </mc:AlternateContent>
+  <p:timing>
+    <p:tnLst>
+      <p:par>
+        <p:cTn id="1" dur="indefinite" restart="never" nodeType="tmRoot"/>
+      </p:par>
+    </p:tnLst>
+  </p:timing>
 </p:sld>
 </file>
 
@@ -6093,16 +6707,45 @@
           </a:bodyPr>
           <a:lstStyle/>
           <a:p>
-            <a:r>
-              <a:rPr lang="en-US"/>
-              <a:t>This ability to control the access to an object can be required for a variety of reasons: controlling when a costly object needs to be instantiated and initialized, giving different access rights to an object, as well as providing a sophisticated means of accessing and referencing objects running in other processes, on other machines.</a:t>
-            </a:r>
-          </a:p>
-          <a:p>
-            <a:r>
-              <a:rPr lang="en-US"/>
-              <a:t>Consider for example an image viewer program. An image viewer program must be able to list and display high resolution photo objects that are in a folder, but how often do someone open a folder and view all the images inside. Sometimes you will be looking for a particular photo, sometimes you will only want to see an image name. The image viewer must be able to list all photo objects, but the photo objects must not be loaded into memory until they are required to be rendered.</a:t>
-            </a:r>
+            <a:pPr lvl="1">
+              <a:buFont typeface="Courier New" panose="02070309020205020404" pitchFamily="49" charset="0"/>
+              <a:buChar char="o"/>
+            </a:pPr>
+            <a:r>
+              <a:rPr lang="en-US" smtClean="0"/>
+              <a:t>Khi ta cần khả năng kiểm soát các truy xuất đến đôi tượng do nhiều lý do khác nhau:</a:t>
+            </a:r>
+          </a:p>
+          <a:p>
+            <a:pPr lvl="2">
+              <a:buFont typeface="Courier New" panose="02070309020205020404" pitchFamily="49" charset="0"/>
+              <a:buChar char="o"/>
+            </a:pPr>
+            <a:r>
+              <a:rPr lang="en-US" smtClean="0"/>
+              <a:t>Khi đối tượng đó tốn nhiều tài nguyên để được khởi tạo</a:t>
+            </a:r>
+          </a:p>
+          <a:p>
+            <a:pPr lvl="2">
+              <a:buFont typeface="Courier New" panose="02070309020205020404" pitchFamily="49" charset="0"/>
+              <a:buChar char="o"/>
+            </a:pPr>
+            <a:r>
+              <a:rPr lang="en-US" smtClean="0"/>
+              <a:t>Cung cấp các quyền truy cập vào đối tượng,</a:t>
+            </a:r>
+          </a:p>
+          <a:p>
+            <a:pPr lvl="2">
+              <a:buFont typeface="Courier New" panose="02070309020205020404" pitchFamily="49" charset="0"/>
+              <a:buChar char="o"/>
+            </a:pPr>
+            <a:r>
+              <a:rPr lang="en-US" smtClean="0"/>
+              <a:t>Cung cấp một cách truy cập sophisticated đối tượng đang chạy trên một tiến trình khác hay trên một máy tính khác</a:t>
+            </a:r>
+            <a:endParaRPr lang="en-US"/>
           </a:p>
         </p:txBody>
       </p:sp>
@@ -6128,6 +6771,13 @@
       </p:transition>
     </mc:Fallback>
   </mc:AlternateContent>
+  <p:timing>
+    <p:tnLst>
+      <p:par>
+        <p:cTn id="1" dur="indefinite" restart="never" nodeType="tmRoot"/>
+      </p:par>
+    </p:tnLst>
+  </p:timing>
 </p:sld>
 </file>
 
@@ -6325,7 +6975,7 @@
         <p:spPr/>
         <p:txBody>
           <a:bodyPr>
-            <a:normAutofit fontScale="77500" lnSpcReduction="20000"/>
+            <a:normAutofit lnSpcReduction="10000"/>
           </a:bodyPr>
           <a:lstStyle/>
           <a:p>
@@ -6367,58 +7017,75 @@
             </a:r>
             <a:r>
               <a:rPr lang="vi-VN"/>
-              <a:t>phức tạp đến một đối tượng.</a:t>
+              <a:t>phức tạp đến một đối tượng</a:t>
+            </a:r>
+            <a:r>
+              <a:rPr lang="vi-VN" smtClean="0"/>
+              <a:t>.</a:t>
+            </a:r>
+            <a:endParaRPr lang="en-US" smtClean="0"/>
+          </a:p>
+          <a:p>
+            <a:pPr lvl="1"/>
+            <a:r>
+              <a:rPr lang="en-US" smtClean="0"/>
+              <a:t>Các tình huống thường thấy khi cần áp dụng một mẫu proxy:</a:t>
+            </a:r>
+          </a:p>
+          <a:p>
+            <a:pPr lvl="2"/>
+            <a:r>
+              <a:rPr lang="en-US" smtClean="0"/>
+              <a:t>Proxy ảo: làm trì hoãn quá trình khởi tạo của một đối tượng tốn kém cho đến khi thực sự cần.. Ví dụ như chỉ tạo ra một đối tượng RealSubject khi và chỉ khi phương thức doSomething của nó được gọi tới.</a:t>
+            </a:r>
+          </a:p>
+          <a:p>
+            <a:pPr lvl="2"/>
+            <a:r>
+              <a:rPr lang="en-US" smtClean="0"/>
+              <a:t>Proxy từ xa: cung cấp một thể hiện cục bộ của một đối tượng trong một khoảng không gian địa chỉ khác. Một ví dụ là đối tượng stub của Java RMI. Đối tượng stub của RMI hoạt động như một proxy khi chúng ta invoke các phương thức của nó thì nó sẽ liên lạc với các đối tượng từ xa trên các máy tính khác (remote object) và invoke các phương thức của chúng.</a:t>
+            </a:r>
+          </a:p>
+          <a:p>
+            <a:pPr lvl="2"/>
+            <a:r>
+              <a:rPr lang="en-US" smtClean="0"/>
+              <a:t>Proxy bảo vệ: khi một proxy điều khiển truy cập đối một đối tượng RealObject nào đó, cho phép chúng từ đối không  bị truy xuất bởi các đối tượng khác.</a:t>
+            </a:r>
+          </a:p>
+          <a:p>
+            <a:pPr lvl="2"/>
+            <a:r>
+              <a:rPr lang="en-US"/>
+              <a:t>Liên kết thông minh: cung cấp </a:t>
+            </a:r>
+            <a:r>
+              <a:rPr lang="en-US"/>
+              <a:t>một </a:t>
+            </a:r>
+            <a:r>
+              <a:rPr lang="en-US" smtClean="0"/>
+              <a:t>cách </a:t>
+            </a:r>
+            <a:r>
+              <a:rPr lang="en-US"/>
+              <a:t>truy </a:t>
+            </a:r>
+            <a:r>
+              <a:rPr lang="en-US"/>
+              <a:t>cập </a:t>
+            </a:r>
+            <a:r>
+              <a:rPr lang="en-US" smtClean="0"/>
+              <a:t>sophisticated đến một số đối tượng nào đó và theo dõi số lượng các tham chiếu đên đối tượng và ngăn cản các truy cập tiếp theo nếu con số này đạt mức giới hạn, cũng như nạp một đối tượng từ CSDL vào bộ nhớ một cách demand</a:t>
             </a:r>
             <a:endParaRPr lang="en-US"/>
           </a:p>
           <a:p>
             <a:r>
               <a:rPr lang="en-US"/>
-              <a:t>Common Situations where the proxy pattern is applicable are:</a:t>
-            </a:r>
-            <a:br>
-              <a:rPr lang="en-US"/>
-            </a:br>
-            <a:r>
-              <a:rPr lang="en-US" b="1"/>
-              <a:t>Virtual Proxies</a:t>
-            </a:r>
-            <a:r>
-              <a:rPr lang="en-US"/>
-              <a:t>: delaying the creation and initialization of expensive objects until needed, where the objects are created on demand (For example creating the RealSubject object only when the doSomething method is invoked).</a:t>
-            </a:r>
-          </a:p>
-          <a:p>
-            <a:r>
-              <a:rPr lang="en-US" b="1"/>
-              <a:t>Remote Proxies</a:t>
-            </a:r>
-            <a:r>
-              <a:rPr lang="en-US"/>
-              <a:t>: providing a local representation for an object that is in a different address space. A common example is Java RMI stub objects. The stub object acts as a proxy where invoking methods on the stub would cause the stub to communicate and invoke methods on a remote object (called skeleton) found on a different machine.</a:t>
-            </a:r>
-          </a:p>
-          <a:p>
-            <a:r>
-              <a:rPr lang="en-US" b="1"/>
-              <a:t>Protection Proxies</a:t>
-            </a:r>
-            <a:r>
-              <a:rPr lang="en-US"/>
-              <a:t>: where a proxy controls access to RealSubject methods, by giving access to some objects while denying access to others.</a:t>
-            </a:r>
-          </a:p>
-          <a:p>
-            <a:r>
-              <a:rPr lang="en-US" b="1"/>
-              <a:t>Smart References</a:t>
-            </a:r>
-            <a:r>
-              <a:rPr lang="en-US"/>
-              <a:t>: providing a sophisticated access to certain objects such as tracking the number of references to an object and denying access if a certain number is reached, as well as loading an object from database into memory on demand.</a:t>
-            </a:r>
-          </a:p>
-          <a:p>
+              <a:t/>
+            </a:r>
             <a:br>
               <a:rPr lang="en-US"/>
             </a:br>
@@ -6451,6 +7118,13 @@
       </p:transition>
     </mc:Fallback>
   </mc:AlternateContent>
+  <p:timing>
+    <p:tnLst>
+      <p:par>
+        <p:cTn id="1" dur="indefinite" restart="never" nodeType="tmRoot"/>
+      </p:par>
+    </p:tnLst>
+  </p:timing>
 </p:sld>
 </file>
 
@@ -6542,6 +7216,13 @@
       </p:transition>
     </mc:Fallback>
   </mc:AlternateContent>
+  <p:timing>
+    <p:tnLst>
+      <p:par>
+        <p:cTn id="1" dur="indefinite" restart="never" nodeType="tmRoot"/>
+      </p:par>
+    </p:tnLst>
+  </p:timing>
 </p:sld>
 </file>
 
@@ -6598,7 +7279,7 @@
         <p:spPr/>
         <p:txBody>
           <a:bodyPr>
-            <a:normAutofit fontScale="85000" lnSpcReduction="20000"/>
+            <a:normAutofit fontScale="77500" lnSpcReduction="20000"/>
           </a:bodyPr>
           <a:lstStyle/>
           <a:p>
@@ -6615,8 +7296,19 @@
           <a:p>
             <a:pPr lvl="2"/>
             <a:r>
-              <a:rPr lang="en-US"/>
-              <a:t>maintains a reference that lets the proxy access the real subject. Proxy</a:t>
+              <a:rPr lang="en-US" smtClean="0"/>
+              <a:t>Giữ một tham chiếu cho phép proxy truy cập đến đối tượng thực sự.</a:t>
+            </a:r>
+          </a:p>
+          <a:p>
+            <a:pPr lvl="2"/>
+            <a:r>
+              <a:rPr lang="en-US" smtClean="0"/>
+              <a:t>maintains </a:t>
+            </a:r>
+            <a:r>
+              <a:rPr lang="en-US"/>
+              <a:t>a reference that lets the proxy access the real subject. Proxy</a:t>
             </a:r>
             <a:br>
               <a:rPr lang="en-US"/>
@@ -6752,14 +7444,27 @@
             <a:pPr lvl="1"/>
             <a:r>
               <a:rPr lang="en-US" b="1"/>
-              <a:t>Subject (IMath)</a:t>
-            </a:r>
+              <a:t>Subject </a:t>
+            </a:r>
+            <a:endParaRPr lang="en-US" b="1" smtClean="0"/>
           </a:p>
           <a:p>
             <a:pPr lvl="2"/>
             <a:r>
-              <a:rPr lang="en-US"/>
-              <a:t>defines the common interface for RealSubject and Proxy so that a Proxy</a:t>
+              <a:rPr lang="en-US" smtClean="0"/>
+              <a:t>Định nghĩa một giao diện chung cho cả RealSubject và Proxy, do đó một Proxy có thể được sử dụng ở bất kỳ đâu yêu cầu một đối tượng kiểu RealSubject.</a:t>
+            </a:r>
+            <a:endParaRPr lang="en-US" smtClean="0"/>
+          </a:p>
+          <a:p>
+            <a:pPr lvl="2"/>
+            <a:r>
+              <a:rPr lang="en-US" smtClean="0"/>
+              <a:t>defines </a:t>
+            </a:r>
+            <a:r>
+              <a:rPr lang="en-US"/>
+              <a:t>the common interface for RealSubject and Proxy so that a Proxy</a:t>
             </a:r>
             <a:br>
               <a:rPr lang="en-US"/>
@@ -6773,18 +7478,23 @@
             <a:pPr lvl="1"/>
             <a:r>
               <a:rPr lang="en-US" b="1"/>
-              <a:t>RealSubject (Math)</a:t>
-            </a:r>
+              <a:t>RealSubject </a:t>
+            </a:r>
+            <a:endParaRPr lang="en-US" smtClean="0"/>
           </a:p>
           <a:p>
             <a:pPr lvl="2"/>
             <a:r>
-              <a:rPr lang="en-US"/>
-              <a:t>defines the real object that the proxy represents </a:t>
+              <a:rPr lang="en-US" smtClean="0"/>
+              <a:t>Định nghĩa đối tượng thực sự mà proxy đang thể hiện</a:t>
             </a:r>
             <a:br>
-              <a:rPr lang="en-US"/>
+              <a:rPr lang="en-US" smtClean="0"/>
             </a:br>
+            <a:r>
+              <a:rPr lang="en-US"/>
+              <a:t/>
+            </a:r>
             <a:br>
               <a:rPr lang="en-US"/>
             </a:br>
@@ -6814,6 +7524,13 @@
       </p:transition>
     </mc:Fallback>
   </mc:AlternateContent>
+  <p:timing>
+    <p:tnLst>
+      <p:par>
+        <p:cTn id="1" dur="indefinite" restart="never" nodeType="tmRoot"/>
+      </p:par>
+    </p:tnLst>
+  </p:timing>
 </p:sld>
 </file>
 
@@ -6921,6 +7638,13 @@
       </p:transition>
     </mc:Fallback>
   </mc:AlternateContent>
+  <p:timing>
+    <p:tnLst>
+      <p:par>
+        <p:cTn id="1" dur="indefinite" restart="never" nodeType="tmRoot"/>
+      </p:par>
+    </p:tnLst>
+  </p:timing>
 </p:sld>
 </file>
 
@@ -7645,7 +8369,62 @@
             <a:pPr lvl="2"/>
             <a:r>
               <a:rPr lang="en-US" b="1"/>
-              <a:t>Adapter </a:t>
+              <a:t>Adapter – C</a:t>
+            </a:r>
+            <a:r>
+              <a:rPr lang="en-US"/>
+              <a:t>ung cấp một giao diện mới phù hợp hơn cho một đối tượng</a:t>
+            </a:r>
+          </a:p>
+          <a:p>
+            <a:pPr lvl="2"/>
+            <a:r>
+              <a:rPr lang="en-US" b="1"/>
+              <a:t>Bridge – </a:t>
+            </a:r>
+            <a:r>
+              <a:rPr lang="en-US"/>
+              <a:t>Tách rời phần trừu tượng và phàn hiện thức của một đối tượng</a:t>
+            </a:r>
+          </a:p>
+          <a:p>
+            <a:pPr lvl="2"/>
+            <a:r>
+              <a:rPr lang="en-US" b="1"/>
+              <a:t>Com	posite – </a:t>
+            </a:r>
+            <a:r>
+              <a:rPr lang="en-US"/>
+              <a:t>Kết hợp nhiều đối tượng bên trong một đối tượng khác để quản lý</a:t>
+            </a:r>
+          </a:p>
+          <a:p>
+            <a:pPr lvl="2"/>
+            <a:r>
+              <a:rPr lang="en-US" b="1"/>
+              <a:t>Decorator – </a:t>
+            </a:r>
+            <a:r>
+              <a:rPr lang="en-US"/>
+              <a:t>Cung cấp them các trách nhiệm cho một đôi tượng một cách linh hoạt</a:t>
+            </a:r>
+          </a:p>
+          <a:p>
+            <a:pPr lvl="2"/>
+            <a:r>
+              <a:rPr lang="en-US" b="1"/>
+              <a:t>Façade – </a:t>
+            </a:r>
+            <a:r>
+              <a:rPr lang="en-US"/>
+              <a:t>Cung cấp một giao diện duy nhất cho một </a:t>
+            </a:r>
+          </a:p>
+          <a:p>
+            <a:pPr lvl="2"/>
+            <a:r>
+              <a:rPr lang="en-US" b="1"/>
+              <a:t>Flyweight - </a:t>
             </a:r>
             <a:endParaRPr lang="en-US"/>
           </a:p>
@@ -7653,49 +8432,12 @@
             <a:pPr lvl="2"/>
             <a:r>
               <a:rPr lang="en-US" b="1"/>
-              <a:t>Bridge</a:t>
-            </a:r>
-            <a:endParaRPr lang="en-US"/>
-          </a:p>
-          <a:p>
-            <a:pPr lvl="2"/>
-            <a:r>
-              <a:rPr lang="en-US" b="1"/>
-              <a:t>Com	posite</a:t>
-            </a:r>
-            <a:endParaRPr lang="en-US"/>
-          </a:p>
-          <a:p>
-            <a:pPr lvl="2"/>
-            <a:r>
-              <a:rPr lang="en-US" b="1"/>
-              <a:t>Decorator</a:t>
-            </a:r>
-            <a:endParaRPr lang="en-US"/>
-          </a:p>
-          <a:p>
-            <a:pPr lvl="2"/>
-            <a:r>
-              <a:rPr lang="en-US" b="1"/>
-              <a:t>Façade</a:t>
-            </a:r>
-            <a:endParaRPr lang="en-US"/>
-          </a:p>
-          <a:p>
-            <a:pPr lvl="2"/>
-            <a:r>
-              <a:rPr lang="en-US" b="1"/>
-              <a:t>Flyweight</a:t>
-            </a:r>
-            <a:endParaRPr lang="en-US"/>
-          </a:p>
-          <a:p>
-            <a:pPr lvl="2"/>
-            <a:r>
-              <a:rPr lang="en-US" b="1"/>
-              <a:t>Proxy</a:t>
-            </a:r>
-            <a:endParaRPr lang="en-US"/>
+              <a:t>Proxy – </a:t>
+            </a:r>
+            <a:r>
+              <a:rPr lang="en-US"/>
+              <a:t>Cung cấp một sự kiểm soát các truy cập đến một đối tượng</a:t>
+            </a:r>
           </a:p>
           <a:p>
             <a:pPr lvl="2"/>

</xml_diff>